<commit_message>
Random Foreset Holdout Test
</commit_message>
<xml_diff>
--- a/22_EvaluationMetrics.pptx
+++ b/22_EvaluationMetrics.pptx
@@ -7572,8 +7572,8 @@
           </a:p>
         </p:txBody>
       </p:sp>
-      <mc:AlternateContent xmlns:mc="http://schemas.openxmlformats.org/markup-compatibility/2006" xmlns:a14="http://schemas.microsoft.com/office/drawing/2010/main">
-        <mc:Choice Requires="a14">
+      <mc:AlternateContent xmlns:mc="http://schemas.openxmlformats.org/markup-compatibility/2006">
+        <mc:Choice xmlns:a14="http://schemas.microsoft.com/office/drawing/2010/main" Requires="a14">
           <p:sp>
             <p:nvSpPr>
               <p:cNvPr id="7" name="TextBox 6">
@@ -7723,7 +7723,7 @@
             </p:txBody>
           </p:sp>
         </mc:Choice>
-        <mc:Fallback xmlns="">
+        <mc:Fallback>
           <p:sp>
             <p:nvSpPr>
               <p:cNvPr id="7" name="TextBox 6">
@@ -7768,8 +7768,8 @@
           </p:sp>
         </mc:Fallback>
       </mc:AlternateContent>
-      <mc:AlternateContent xmlns:mc="http://schemas.openxmlformats.org/markup-compatibility/2006" xmlns:a14="http://schemas.microsoft.com/office/drawing/2010/main">
-        <mc:Choice Requires="a14">
+      <mc:AlternateContent xmlns:mc="http://schemas.openxmlformats.org/markup-compatibility/2006">
+        <mc:Choice xmlns:a14="http://schemas.microsoft.com/office/drawing/2010/main" Requires="a14">
           <p:sp>
             <p:nvSpPr>
               <p:cNvPr id="21" name="TextBox 20">
@@ -7793,7 +7793,7 @@
               <a:noFill/>
             </p:spPr>
             <p:txBody>
-              <a:bodyPr wrap="none" lIns="0" tIns="0" rIns="0" bIns="0" rtlCol="0">
+              <a:bodyPr wrap="square" lIns="0" tIns="0" rIns="0" bIns="0" rtlCol="0">
                 <a:spAutoFit/>
               </a:bodyPr>
               <a:lstStyle/>
@@ -7961,7 +7961,7 @@
             </p:txBody>
           </p:sp>
         </mc:Choice>
-        <mc:Fallback xmlns="">
+        <mc:Fallback>
           <p:sp>
             <p:nvSpPr>
               <p:cNvPr id="21" name="TextBox 20">
@@ -8006,8 +8006,8 @@
           </p:sp>
         </mc:Fallback>
       </mc:AlternateContent>
-      <mc:AlternateContent xmlns:mc="http://schemas.openxmlformats.org/markup-compatibility/2006" xmlns:a14="http://schemas.microsoft.com/office/drawing/2010/main">
-        <mc:Choice Requires="a14">
+      <mc:AlternateContent xmlns:mc="http://schemas.openxmlformats.org/markup-compatibility/2006">
+        <mc:Choice xmlns:a14="http://schemas.microsoft.com/office/drawing/2010/main" Requires="a14">
           <p:sp>
             <p:nvSpPr>
               <p:cNvPr id="34" name="TextBox 33">
@@ -8023,7 +8023,7 @@
             <p:spPr>
               <a:xfrm>
                 <a:off x="508217" y="4743828"/>
-                <a:ext cx="3703743" cy="441211"/>
+                <a:ext cx="3919767" cy="441211"/>
               </a:xfrm>
               <a:prstGeom prst="rect">
                 <a:avLst/>
@@ -8187,7 +8187,7 @@
             </p:txBody>
           </p:sp>
         </mc:Choice>
-        <mc:Fallback xmlns="">
+        <mc:Fallback>
           <p:sp>
             <p:nvSpPr>
               <p:cNvPr id="34" name="TextBox 33">
@@ -8205,7 +8205,7 @@
             <p:spPr>
               <a:xfrm>
                 <a:off x="508217" y="4743828"/>
-                <a:ext cx="3703743" cy="441211"/>
+                <a:ext cx="3919767" cy="441211"/>
               </a:xfrm>
               <a:prstGeom prst="rect">
                 <a:avLst/>
@@ -8213,7 +8213,7 @@
               <a:blipFill>
                 <a:blip r:embed="rId5"/>
                 <a:stretch>
-                  <a:fillRect l="-2303" t="-2740" b="-17808"/>
+                  <a:fillRect l="-2177" t="-2740" b="-17808"/>
                 </a:stretch>
               </a:blipFill>
             </p:spPr>

</xml_diff>